<commit_message>
Update Spring Slide Deck
</commit_message>
<xml_diff>
--- a/SpringSlideDeck.pptx
+++ b/SpringSlideDeck.pptx
@@ -208,7 +208,7 @@
           <a:p>
             <a:fld id="{C6611962-81CE-4AA7-8264-984BD85B0C67}" type="datetimeFigureOut">
               <a:rPr lang="en-US" smtClean="0"/>
-              <a:t>3/23/2024</a:t>
+              <a:t>3/26/2024</a:t>
             </a:fld>
             <a:endParaRPr lang="en-US"/>
           </a:p>
@@ -806,12 +806,6 @@
           <a:p>
             <a:r>
               <a:rPr lang="en-US" dirty="0"/>
-              <a:t>-Buttons swallowing slide input as presses</a:t>
-            </a:r>
-          </a:p>
-          <a:p>
-            <a:r>
-              <a:rPr lang="en-US" dirty="0"/>
               <a:t>-Made a modification on prefix sort, where the final character of the saved word would be dropped in the filter step</a:t>
             </a:r>
           </a:p>
@@ -1000,7 +994,7 @@
           <a:p>
             <a:fld id="{D5D13250-15FC-4A8E-969C-CCAEF0623622}" type="datetimeFigureOut">
               <a:rPr lang="en-US" smtClean="0"/>
-              <a:t>3/23/2024</a:t>
+              <a:t>3/26/2024</a:t>
             </a:fld>
             <a:endParaRPr lang="en-US"/>
           </a:p>
@@ -1198,7 +1192,7 @@
           <a:p>
             <a:fld id="{D5D13250-15FC-4A8E-969C-CCAEF0623622}" type="datetimeFigureOut">
               <a:rPr lang="en-US" smtClean="0"/>
-              <a:t>3/23/2024</a:t>
+              <a:t>3/26/2024</a:t>
             </a:fld>
             <a:endParaRPr lang="en-US"/>
           </a:p>
@@ -1406,7 +1400,7 @@
           <a:p>
             <a:fld id="{D5D13250-15FC-4A8E-969C-CCAEF0623622}" type="datetimeFigureOut">
               <a:rPr lang="en-US" smtClean="0"/>
-              <a:t>3/23/2024</a:t>
+              <a:t>3/26/2024</a:t>
             </a:fld>
             <a:endParaRPr lang="en-US"/>
           </a:p>
@@ -1604,7 +1598,7 @@
           <a:p>
             <a:fld id="{D5D13250-15FC-4A8E-969C-CCAEF0623622}" type="datetimeFigureOut">
               <a:rPr lang="en-US" smtClean="0"/>
-              <a:t>3/23/2024</a:t>
+              <a:t>3/26/2024</a:t>
             </a:fld>
             <a:endParaRPr lang="en-US"/>
           </a:p>
@@ -1879,7 +1873,7 @@
           <a:p>
             <a:fld id="{D5D13250-15FC-4A8E-969C-CCAEF0623622}" type="datetimeFigureOut">
               <a:rPr lang="en-US" smtClean="0"/>
-              <a:t>3/23/2024</a:t>
+              <a:t>3/26/2024</a:t>
             </a:fld>
             <a:endParaRPr lang="en-US"/>
           </a:p>
@@ -2144,7 +2138,7 @@
           <a:p>
             <a:fld id="{D5D13250-15FC-4A8E-969C-CCAEF0623622}" type="datetimeFigureOut">
               <a:rPr lang="en-US" smtClean="0"/>
-              <a:t>3/23/2024</a:t>
+              <a:t>3/26/2024</a:t>
             </a:fld>
             <a:endParaRPr lang="en-US"/>
           </a:p>
@@ -2556,7 +2550,7 @@
           <a:p>
             <a:fld id="{D5D13250-15FC-4A8E-969C-CCAEF0623622}" type="datetimeFigureOut">
               <a:rPr lang="en-US" smtClean="0"/>
-              <a:t>3/23/2024</a:t>
+              <a:t>3/26/2024</a:t>
             </a:fld>
             <a:endParaRPr lang="en-US"/>
           </a:p>
@@ -2697,7 +2691,7 @@
           <a:p>
             <a:fld id="{D5D13250-15FC-4A8E-969C-CCAEF0623622}" type="datetimeFigureOut">
               <a:rPr lang="en-US" smtClean="0"/>
-              <a:t>3/23/2024</a:t>
+              <a:t>3/26/2024</a:t>
             </a:fld>
             <a:endParaRPr lang="en-US"/>
           </a:p>
@@ -2810,7 +2804,7 @@
           <a:p>
             <a:fld id="{D5D13250-15FC-4A8E-969C-CCAEF0623622}" type="datetimeFigureOut">
               <a:rPr lang="en-US" smtClean="0"/>
-              <a:t>3/23/2024</a:t>
+              <a:t>3/26/2024</a:t>
             </a:fld>
             <a:endParaRPr lang="en-US"/>
           </a:p>
@@ -3121,7 +3115,7 @@
           <a:p>
             <a:fld id="{D5D13250-15FC-4A8E-969C-CCAEF0623622}" type="datetimeFigureOut">
               <a:rPr lang="en-US" smtClean="0"/>
-              <a:t>3/23/2024</a:t>
+              <a:t>3/26/2024</a:t>
             </a:fld>
             <a:endParaRPr lang="en-US"/>
           </a:p>
@@ -3409,7 +3403,7 @@
           <a:p>
             <a:fld id="{D5D13250-15FC-4A8E-969C-CCAEF0623622}" type="datetimeFigureOut">
               <a:rPr lang="en-US" smtClean="0"/>
-              <a:t>3/23/2024</a:t>
+              <a:t>3/26/2024</a:t>
             </a:fld>
             <a:endParaRPr lang="en-US"/>
           </a:p>
@@ -3650,7 +3644,7 @@
           <a:p>
             <a:fld id="{D5D13250-15FC-4A8E-969C-CCAEF0623622}" type="datetimeFigureOut">
               <a:rPr lang="en-US" smtClean="0"/>
-              <a:t>3/23/2024</a:t>
+              <a:t>3/26/2024</a:t>
             </a:fld>
             <a:endParaRPr lang="en-US"/>
           </a:p>
@@ -4449,15 +4443,7 @@
           <a:p>
             <a:r>
               <a:rPr lang="en-US" dirty="0"/>
-              <a:t>Polish/bugfixing may continue up until the Expo, by which point the source code and </a:t>
-            </a:r>
-            <a:r>
-              <a:rPr lang="en-US" dirty="0" err="1"/>
-              <a:t>apk</a:t>
-            </a:r>
-            <a:r>
-              <a:rPr lang="en-US" dirty="0"/>
-              <a:t> will be uploaded to the project repo</a:t>
+              <a:t>An android APK has been uploaded to Dropbox with a link from the GitHub repository</a:t>
             </a:r>
           </a:p>
           <a:p>

</xml_diff>